<commit_message>
Correcao das Acs6 e 7
</commit_message>
<xml_diff>
--- a/ACS/AC6/OPE_PlotTwist_AC06_V2.pptx
+++ b/ACS/AC6/OPE_PlotTwist_AC06_V2.pptx
@@ -247,7 +247,7 @@
           <a:p>
             <a:fld id="{92E422EF-B27F-4667-8CA7-4B1FA23F92F5}" type="datetimeFigureOut">
               <a:rPr lang="pt-BR" smtClean="0"/>
-              <a:t>21/05/2019</a:t>
+              <a:t>27/05/2019</a:t>
             </a:fld>
             <a:endParaRPr lang="pt-BR"/>
           </a:p>
@@ -415,7 +415,7 @@
           <a:p>
             <a:fld id="{92E422EF-B27F-4667-8CA7-4B1FA23F92F5}" type="datetimeFigureOut">
               <a:rPr lang="pt-BR" smtClean="0"/>
-              <a:t>21/05/2019</a:t>
+              <a:t>27/05/2019</a:t>
             </a:fld>
             <a:endParaRPr lang="pt-BR"/>
           </a:p>
@@ -593,7 +593,7 @@
           <a:p>
             <a:fld id="{92E422EF-B27F-4667-8CA7-4B1FA23F92F5}" type="datetimeFigureOut">
               <a:rPr lang="pt-BR" smtClean="0"/>
-              <a:t>21/05/2019</a:t>
+              <a:t>27/05/2019</a:t>
             </a:fld>
             <a:endParaRPr lang="pt-BR"/>
           </a:p>
@@ -761,7 +761,7 @@
           <a:p>
             <a:fld id="{92E422EF-B27F-4667-8CA7-4B1FA23F92F5}" type="datetimeFigureOut">
               <a:rPr lang="pt-BR" smtClean="0"/>
-              <a:t>21/05/2019</a:t>
+              <a:t>27/05/2019</a:t>
             </a:fld>
             <a:endParaRPr lang="pt-BR"/>
           </a:p>
@@ -1006,7 +1006,7 @@
           <a:p>
             <a:fld id="{92E422EF-B27F-4667-8CA7-4B1FA23F92F5}" type="datetimeFigureOut">
               <a:rPr lang="pt-BR" smtClean="0"/>
-              <a:t>21/05/2019</a:t>
+              <a:t>27/05/2019</a:t>
             </a:fld>
             <a:endParaRPr lang="pt-BR"/>
           </a:p>
@@ -1235,7 +1235,7 @@
           <a:p>
             <a:fld id="{92E422EF-B27F-4667-8CA7-4B1FA23F92F5}" type="datetimeFigureOut">
               <a:rPr lang="pt-BR" smtClean="0"/>
-              <a:t>21/05/2019</a:t>
+              <a:t>27/05/2019</a:t>
             </a:fld>
             <a:endParaRPr lang="pt-BR"/>
           </a:p>
@@ -1599,7 +1599,7 @@
           <a:p>
             <a:fld id="{92E422EF-B27F-4667-8CA7-4B1FA23F92F5}" type="datetimeFigureOut">
               <a:rPr lang="pt-BR" smtClean="0"/>
-              <a:t>21/05/2019</a:t>
+              <a:t>27/05/2019</a:t>
             </a:fld>
             <a:endParaRPr lang="pt-BR"/>
           </a:p>
@@ -1716,7 +1716,7 @@
           <a:p>
             <a:fld id="{92E422EF-B27F-4667-8CA7-4B1FA23F92F5}" type="datetimeFigureOut">
               <a:rPr lang="pt-BR" smtClean="0"/>
-              <a:t>21/05/2019</a:t>
+              <a:t>27/05/2019</a:t>
             </a:fld>
             <a:endParaRPr lang="pt-BR"/>
           </a:p>
@@ -1811,7 +1811,7 @@
           <a:p>
             <a:fld id="{92E422EF-B27F-4667-8CA7-4B1FA23F92F5}" type="datetimeFigureOut">
               <a:rPr lang="pt-BR" smtClean="0"/>
-              <a:t>21/05/2019</a:t>
+              <a:t>27/05/2019</a:t>
             </a:fld>
             <a:endParaRPr lang="pt-BR"/>
           </a:p>
@@ -2086,7 +2086,7 @@
           <a:p>
             <a:fld id="{92E422EF-B27F-4667-8CA7-4B1FA23F92F5}" type="datetimeFigureOut">
               <a:rPr lang="pt-BR" smtClean="0"/>
-              <a:t>21/05/2019</a:t>
+              <a:t>27/05/2019</a:t>
             </a:fld>
             <a:endParaRPr lang="pt-BR"/>
           </a:p>
@@ -2338,7 +2338,7 @@
           <a:p>
             <a:fld id="{92E422EF-B27F-4667-8CA7-4B1FA23F92F5}" type="datetimeFigureOut">
               <a:rPr lang="pt-BR" smtClean="0"/>
-              <a:t>21/05/2019</a:t>
+              <a:t>27/05/2019</a:t>
             </a:fld>
             <a:endParaRPr lang="pt-BR"/>
           </a:p>
@@ -2549,7 +2549,7 @@
           <a:p>
             <a:fld id="{92E422EF-B27F-4667-8CA7-4B1FA23F92F5}" type="datetimeFigureOut">
               <a:rPr lang="pt-BR" smtClean="0"/>
-              <a:t>21/05/2019</a:t>
+              <a:t>27/05/2019</a:t>
             </a:fld>
             <a:endParaRPr lang="pt-BR"/>
           </a:p>
@@ -3057,7 +3057,7 @@
           <p:cNvPr id="2" name="Título 1">
             <a:extLst>
               <a:ext uri="{FF2B5EF4-FFF2-40B4-BE49-F238E27FC236}">
-                <a16:creationId xmlns:a16="http://schemas.microsoft.com/office/drawing/2014/main" id="{41E35EBE-C448-4D39-83D1-DCD9B4281E8B}"/>
+                <a16:creationId xmlns="" xmlns:a16="http://schemas.microsoft.com/office/drawing/2014/main" id="{41E35EBE-C448-4D39-83D1-DCD9B4281E8B}"/>
               </a:ext>
             </a:extLst>
           </p:cNvPr>
@@ -3153,7 +3153,7 @@
           <p:cNvPr id="5" name="CaixaDeTexto 4">
             <a:extLst>
               <a:ext uri="{FF2B5EF4-FFF2-40B4-BE49-F238E27FC236}">
-                <a16:creationId xmlns:a16="http://schemas.microsoft.com/office/drawing/2014/main" id="{540AE129-418D-4D59-9E78-B091A9997094}"/>
+                <a16:creationId xmlns="" xmlns:a16="http://schemas.microsoft.com/office/drawing/2014/main" id="{540AE129-418D-4D59-9E78-B091A9997094}"/>
               </a:ext>
             </a:extLst>
           </p:cNvPr>
@@ -3221,7 +3221,7 @@
           <p:cNvPr id="6" name="CaixaDeTexto 5">
             <a:extLst>
               <a:ext uri="{FF2B5EF4-FFF2-40B4-BE49-F238E27FC236}">
-                <a16:creationId xmlns:a16="http://schemas.microsoft.com/office/drawing/2014/main" id="{715ECE7B-F979-42F6-BC88-6928AEADEFCD}"/>
+                <a16:creationId xmlns="" xmlns:a16="http://schemas.microsoft.com/office/drawing/2014/main" id="{715ECE7B-F979-42F6-BC88-6928AEADEFCD}"/>
               </a:ext>
             </a:extLst>
           </p:cNvPr>
@@ -3231,7 +3231,7 @@
         <p:spPr>
           <a:xfrm>
             <a:off x="7040016" y="2619006"/>
-            <a:ext cx="4061637" cy="1200329"/>
+            <a:ext cx="4061637" cy="1754326"/>
           </a:xfrm>
           <a:prstGeom prst="rect">
             <a:avLst/>
@@ -3250,8 +3250,17 @@
             </a:pPr>
             <a:r>
               <a:rPr lang="pt-BR" dirty="0"/>
-              <a:t>Vendedor verifica pedido;</a:t>
-            </a:r>
+              <a:t>Vendedor </a:t>
+            </a:r>
+            <a:r>
+              <a:rPr lang="pt-BR" dirty="0" smtClean="0"/>
+              <a:t>verifica dados de </a:t>
+            </a:r>
+            <a:r>
+              <a:rPr lang="pt-BR" dirty="0" smtClean="0"/>
+              <a:t>pedido em Pedido;</a:t>
+            </a:r>
+            <a:endParaRPr lang="pt-BR" dirty="0"/>
           </a:p>
           <a:p>
             <a:pPr marL="285750" indent="-285750">
@@ -3270,8 +3279,17 @@
             </a:pPr>
             <a:r>
               <a:rPr lang="pt-BR" dirty="0"/>
-              <a:t>Vendedor atualiza pedido;</a:t>
-            </a:r>
+              <a:t>Vendedor </a:t>
+            </a:r>
+            <a:r>
+              <a:rPr lang="pt-BR" dirty="0" smtClean="0"/>
+              <a:t>armazena </a:t>
+            </a:r>
+            <a:r>
+              <a:rPr lang="pt-BR" dirty="0" smtClean="0"/>
+              <a:t>baixa do pedido em Pedido;</a:t>
+            </a:r>
+            <a:endParaRPr lang="pt-BR" dirty="0"/>
           </a:p>
           <a:p>
             <a:endParaRPr lang="pt-BR" dirty="0"/>
@@ -3283,7 +3301,7 @@
           <p:cNvPr id="7" name="Título 1">
             <a:extLst>
               <a:ext uri="{FF2B5EF4-FFF2-40B4-BE49-F238E27FC236}">
-                <a16:creationId xmlns:a16="http://schemas.microsoft.com/office/drawing/2014/main" id="{372122C9-4AE5-4FA8-808F-DB1E152241B7}"/>
+                <a16:creationId xmlns="" xmlns:a16="http://schemas.microsoft.com/office/drawing/2014/main" id="{372122C9-4AE5-4FA8-808F-DB1E152241B7}"/>
               </a:ext>
             </a:extLst>
           </p:cNvPr>
@@ -3334,7 +3352,7 @@
           <p:cNvPr id="2" name="Imagem 1">
             <a:extLst>
               <a:ext uri="{FF2B5EF4-FFF2-40B4-BE49-F238E27FC236}">
-                <a16:creationId xmlns:a16="http://schemas.microsoft.com/office/drawing/2014/main" id="{D245332C-BBFC-4812-A5C3-9B36628021A1}"/>
+                <a16:creationId xmlns="" xmlns:a16="http://schemas.microsoft.com/office/drawing/2014/main" id="{D245332C-BBFC-4812-A5C3-9B36628021A1}"/>
               </a:ext>
             </a:extLst>
           </p:cNvPr>
@@ -3423,13 +3441,7 @@
       </p:sp>
       <p:pic>
         <p:nvPicPr>
-          <p:cNvPr id="5" name="Imagem 4">
-            <a:extLst>
-              <a:ext uri="{FF2B5EF4-FFF2-40B4-BE49-F238E27FC236}">
-                <a16:creationId xmlns:a16="http://schemas.microsoft.com/office/drawing/2014/main" id="{DC46A272-7357-4418-AF14-55AD909F9CB2}"/>
-              </a:ext>
-            </a:extLst>
-          </p:cNvPr>
+          <p:cNvPr id="3" name="Imagem 2"/>
           <p:cNvPicPr>
             <a:picLocks noChangeAspect="1"/>
           </p:cNvPicPr>
@@ -3443,8 +3455,8 @@
         </p:blipFill>
         <p:spPr>
           <a:xfrm>
-            <a:off x="3499158" y="-1511"/>
-            <a:ext cx="6280461" cy="6859511"/>
+            <a:off x="3198922" y="144552"/>
+            <a:ext cx="8168969" cy="6713448"/>
           </a:xfrm>
           <a:prstGeom prst="rect">
             <a:avLst/>
@@ -3518,7 +3530,7 @@
           <p:cNvPr id="8" name="Imagem 7">
             <a:extLst>
               <a:ext uri="{FF2B5EF4-FFF2-40B4-BE49-F238E27FC236}">
-                <a16:creationId xmlns:a16="http://schemas.microsoft.com/office/drawing/2014/main" id="{6D1FB8D8-EAA5-44F2-99FE-95BE44BAB74C}"/>
+                <a16:creationId xmlns="" xmlns:a16="http://schemas.microsoft.com/office/drawing/2014/main" id="{6D1FB8D8-EAA5-44F2-99FE-95BE44BAB74C}"/>
               </a:ext>
             </a:extLst>
           </p:cNvPr>
@@ -3607,14 +3619,14 @@
                 <a:gridCol w="4064000">
                   <a:extLst>
                     <a:ext uri="{9D8B030D-6E8A-4147-A177-3AD203B41FA5}">
-                      <a16:colId xmlns:a16="http://schemas.microsoft.com/office/drawing/2014/main" val="20000"/>
+                      <a16:colId xmlns="" xmlns:a16="http://schemas.microsoft.com/office/drawing/2014/main" val="20000"/>
                     </a:ext>
                   </a:extLst>
                 </a:gridCol>
                 <a:gridCol w="4064000">
                   <a:extLst>
                     <a:ext uri="{9D8B030D-6E8A-4147-A177-3AD203B41FA5}">
-                      <a16:colId xmlns:a16="http://schemas.microsoft.com/office/drawing/2014/main" val="20001"/>
+                      <a16:colId xmlns="" xmlns:a16="http://schemas.microsoft.com/office/drawing/2014/main" val="20001"/>
                     </a:ext>
                   </a:extLst>
                 </a:gridCol>
@@ -3649,7 +3661,7 @@
                 </a:tc>
                 <a:extLst>
                   <a:ext uri="{0D108BD9-81ED-4DB2-BD59-A6C34878D82A}">
-                    <a16:rowId xmlns:a16="http://schemas.microsoft.com/office/drawing/2014/main" val="10000"/>
+                    <a16:rowId xmlns="" xmlns:a16="http://schemas.microsoft.com/office/drawing/2014/main" val="10000"/>
                   </a:ext>
                 </a:extLst>
               </a:tr>
@@ -3692,7 +3704,7 @@
                 </a:tc>
                 <a:extLst>
                   <a:ext uri="{0D108BD9-81ED-4DB2-BD59-A6C34878D82A}">
-                    <a16:rowId xmlns:a16="http://schemas.microsoft.com/office/drawing/2014/main" val="10001"/>
+                    <a16:rowId xmlns="" xmlns:a16="http://schemas.microsoft.com/office/drawing/2014/main" val="10001"/>
                   </a:ext>
                 </a:extLst>
               </a:tr>
@@ -3735,7 +3747,7 @@
                 </a:tc>
                 <a:extLst>
                   <a:ext uri="{0D108BD9-81ED-4DB2-BD59-A6C34878D82A}">
-                    <a16:rowId xmlns:a16="http://schemas.microsoft.com/office/drawing/2014/main" val="10002"/>
+                    <a16:rowId xmlns="" xmlns:a16="http://schemas.microsoft.com/office/drawing/2014/main" val="10002"/>
                   </a:ext>
                 </a:extLst>
               </a:tr>
@@ -3833,14 +3845,14 @@
                 <a:gridCol w="4064000">
                   <a:extLst>
                     <a:ext uri="{9D8B030D-6E8A-4147-A177-3AD203B41FA5}">
-                      <a16:colId xmlns:a16="http://schemas.microsoft.com/office/drawing/2014/main" val="20000"/>
+                      <a16:colId xmlns="" xmlns:a16="http://schemas.microsoft.com/office/drawing/2014/main" val="20000"/>
                     </a:ext>
                   </a:extLst>
                 </a:gridCol>
                 <a:gridCol w="4064000">
                   <a:extLst>
                     <a:ext uri="{9D8B030D-6E8A-4147-A177-3AD203B41FA5}">
-                      <a16:colId xmlns:a16="http://schemas.microsoft.com/office/drawing/2014/main" val="20001"/>
+                      <a16:colId xmlns="" xmlns:a16="http://schemas.microsoft.com/office/drawing/2014/main" val="20001"/>
                     </a:ext>
                   </a:extLst>
                 </a:gridCol>
@@ -3874,7 +3886,7 @@
                 </a:tc>
                 <a:extLst>
                   <a:ext uri="{0D108BD9-81ED-4DB2-BD59-A6C34878D82A}">
-                    <a16:rowId xmlns:a16="http://schemas.microsoft.com/office/drawing/2014/main" val="10000"/>
+                    <a16:rowId xmlns="" xmlns:a16="http://schemas.microsoft.com/office/drawing/2014/main" val="10000"/>
                   </a:ext>
                 </a:extLst>
               </a:tr>
@@ -3907,7 +3919,7 @@
                 </a:tc>
                 <a:extLst>
                   <a:ext uri="{0D108BD9-81ED-4DB2-BD59-A6C34878D82A}">
-                    <a16:rowId xmlns:a16="http://schemas.microsoft.com/office/drawing/2014/main" val="10001"/>
+                    <a16:rowId xmlns="" xmlns:a16="http://schemas.microsoft.com/office/drawing/2014/main" val="10001"/>
                   </a:ext>
                 </a:extLst>
               </a:tr>
@@ -3940,7 +3952,7 @@
                 </a:tc>
                 <a:extLst>
                   <a:ext uri="{0D108BD9-81ED-4DB2-BD59-A6C34878D82A}">
-                    <a16:rowId xmlns:a16="http://schemas.microsoft.com/office/drawing/2014/main" val="10002"/>
+                    <a16:rowId xmlns="" xmlns:a16="http://schemas.microsoft.com/office/drawing/2014/main" val="10002"/>
                   </a:ext>
                 </a:extLst>
               </a:tr>

</xml_diff>